<commit_message>
created edit slide for text only, images are harder
</commit_message>
<xml_diff>
--- a/backend/powerpoint/created_slides/FINAL.pptx
+++ b/backend/powerpoint/created_slides/FINAL.pptx
@@ -197,7 +197,7 @@
           <a:p>
             <a:fld id="{870CC9C5-3247-4881-93EA-827EC4A1B973}" type="datetimeFigureOut">
               <a:rPr lang="en-GB" smtClean="0"/>
-              <a:t>19/02/2025</a:t>
+              <a:t>26/02/2025</a:t>
             </a:fld>
             <a:endParaRPr lang="en-GB"/>
           </a:p>
@@ -660,7 +660,7 @@
           <a:p>
             <a:fld id="{FEBFF904-F2FC-44B1-B43E-CB1CA4DC4CA9}" type="datetime1">
               <a:rPr lang="en-GB" smtClean="0"/>
-              <a:t>19/02/2025</a:t>
+              <a:t>26/02/2025</a:t>
             </a:fld>
             <a:endParaRPr lang="en-GB"/>
           </a:p>
@@ -941,7 +941,7 @@
           <a:p>
             <a:fld id="{3B192CD6-5CA0-4FE4-BECD-124F6938392F}" type="datetime1">
               <a:rPr lang="en-GB" smtClean="0"/>
-              <a:t>19/02/2025</a:t>
+              <a:t>26/02/2025</a:t>
             </a:fld>
             <a:endParaRPr lang="en-GB"/>
           </a:p>
@@ -1133,7 +1133,7 @@
           <a:p>
             <a:fld id="{FBEF7C8E-40FA-48A5-A31D-4409170EAF57}" type="datetime1">
               <a:rPr lang="en-GB" smtClean="0"/>
-              <a:t>19/02/2025</a:t>
+              <a:t>26/02/2025</a:t>
             </a:fld>
             <a:endParaRPr lang="en-GB"/>
           </a:p>
@@ -1394,7 +1394,7 @@
           <a:p>
             <a:fld id="{1778426D-CFCF-477A-BFB2-E5C3A81B9699}" type="datetime1">
               <a:rPr lang="en-GB" smtClean="0"/>
-              <a:t>19/02/2025</a:t>
+              <a:t>26/02/2025</a:t>
             </a:fld>
             <a:endParaRPr lang="en-GB"/>
           </a:p>
@@ -1820,7 +1820,7 @@
           <a:p>
             <a:fld id="{562F7DCD-054A-46B6-969D-786A70B73437}" type="datetime1">
               <a:rPr lang="en-GB" smtClean="0"/>
-              <a:t>19/02/2025</a:t>
+              <a:t>26/02/2025</a:t>
             </a:fld>
             <a:endParaRPr lang="en-GB"/>
           </a:p>
@@ -2366,7 +2366,7 @@
           <a:p>
             <a:fld id="{71D9CBD8-4758-492A-A2A3-9FD0A4C920D4}" type="datetime1">
               <a:rPr lang="en-GB" smtClean="0"/>
-              <a:t>19/02/2025</a:t>
+              <a:t>26/02/2025</a:t>
             </a:fld>
             <a:endParaRPr lang="en-GB"/>
           </a:p>
@@ -3197,7 +3197,7 @@
           <a:p>
             <a:fld id="{3B13688B-08D2-4869-814F-77D13FA477E7}" type="datetime1">
               <a:rPr lang="en-GB" smtClean="0"/>
-              <a:t>19/02/2025</a:t>
+              <a:t>26/02/2025</a:t>
             </a:fld>
             <a:endParaRPr lang="en-GB"/>
           </a:p>
@@ -3367,7 +3367,7 @@
           <a:p>
             <a:fld id="{A7F01AB9-881B-4D32-8098-63D8EE43798E}" type="datetime1">
               <a:rPr lang="en-GB" smtClean="0"/>
-              <a:t>19/02/2025</a:t>
+              <a:t>26/02/2025</a:t>
             </a:fld>
             <a:endParaRPr lang="en-GB"/>
           </a:p>
@@ -3547,7 +3547,7 @@
           <a:p>
             <a:fld id="{6BB3DA4D-9E84-4BA2-86EA-732034ABB9B4}" type="datetime1">
               <a:rPr lang="en-GB" smtClean="0"/>
-              <a:t>19/02/2025</a:t>
+              <a:t>26/02/2025</a:t>
             </a:fld>
             <a:endParaRPr lang="en-GB"/>
           </a:p>
@@ -3717,7 +3717,7 @@
           <a:p>
             <a:fld id="{5436715F-F413-47D4-8CBA-8B84BE9F51D8}" type="datetime1">
               <a:rPr lang="en-GB" smtClean="0"/>
-              <a:t>19/02/2025</a:t>
+              <a:t>26/02/2025</a:t>
             </a:fld>
             <a:endParaRPr lang="en-GB"/>
           </a:p>
@@ -3974,7 +3974,7 @@
           <a:p>
             <a:fld id="{2E40C26F-2385-4DCA-A233-934715856DD8}" type="datetime1">
               <a:rPr lang="en-GB" smtClean="0"/>
-              <a:t>19/02/2025</a:t>
+              <a:t>26/02/2025</a:t>
             </a:fld>
             <a:endParaRPr lang="en-GB"/>
           </a:p>
@@ -4206,7 +4206,7 @@
           <a:p>
             <a:fld id="{02551839-9C6E-4AFA-A77A-EFF7591ABD9F}" type="datetime1">
               <a:rPr lang="en-GB" smtClean="0"/>
-              <a:t>19/02/2025</a:t>
+              <a:t>26/02/2025</a:t>
             </a:fld>
             <a:endParaRPr lang="en-GB"/>
           </a:p>
@@ -4599,7 +4599,7 @@
           <a:p>
             <a:fld id="{A08CEAB6-1322-438C-8456-FF1424EBCBE0}" type="datetime1">
               <a:rPr lang="en-GB" smtClean="0"/>
-              <a:t>19/02/2025</a:t>
+              <a:t>26/02/2025</a:t>
             </a:fld>
             <a:endParaRPr lang="en-GB"/>
           </a:p>
@@ -4717,7 +4717,7 @@
           <a:p>
             <a:fld id="{4B3885A3-CBB0-42F5-8367-8C61CA538BB9}" type="datetime1">
               <a:rPr lang="en-GB" smtClean="0"/>
-              <a:t>19/02/2025</a:t>
+              <a:t>26/02/2025</a:t>
             </a:fld>
             <a:endParaRPr lang="en-GB"/>
           </a:p>
@@ -4812,7 +4812,7 @@
           <a:p>
             <a:fld id="{2EE8FF3B-CCD0-4512-B0A3-91E2F9BBBC9A}" type="datetime1">
               <a:rPr lang="en-GB" smtClean="0"/>
-              <a:t>19/02/2025</a:t>
+              <a:t>26/02/2025</a:t>
             </a:fld>
             <a:endParaRPr lang="en-GB"/>
           </a:p>
@@ -5085,7 +5085,7 @@
           <a:p>
             <a:fld id="{4592F7CD-8F55-4E9D-B1E9-CD64F3D4D60C}" type="datetime1">
               <a:rPr lang="en-GB" smtClean="0"/>
-              <a:t>19/02/2025</a:t>
+              <a:t>26/02/2025</a:t>
             </a:fld>
             <a:endParaRPr lang="en-GB"/>
           </a:p>
@@ -5366,7 +5366,7 @@
           <a:p>
             <a:fld id="{4A62C000-05F7-48E1-8091-A26E7E5100BC}" type="datetime1">
               <a:rPr lang="en-GB" smtClean="0"/>
-              <a:t>19/02/2025</a:t>
+              <a:t>26/02/2025</a:t>
             </a:fld>
             <a:endParaRPr lang="en-GB"/>
           </a:p>
@@ -5606,7 +5606,7 @@
           <a:p>
             <a:fld id="{A6167571-A7EE-46D1-89BA-B10F682DEF10}" type="datetime1">
               <a:rPr lang="en-GB" smtClean="0"/>
-              <a:t>19/02/2025</a:t>
+              <a:t>26/02/2025</a:t>
             </a:fld>
             <a:endParaRPr lang="en-GB"/>
           </a:p>
@@ -6198,7 +6198,7 @@
           <a:lstStyle/>
           <a:p>
             <a:r>
-              <a:t>Test</a:t>
+              <a:t>Cjfshbvfhjsbfhsb</a:t>
             </a:r>
           </a:p>
         </p:txBody>
@@ -6230,8 +6230,10 @@
           <a:lstStyle/>
           <a:p>
             <a:r>
-              <a:t>Content would be here Why bullet points</a:t>
-            </a:r>
+              <a:rPr lang="en-GB" dirty="0" err="1"/>
+              <a:t>kdsnxzbfjhsdbfdsbfu</a:t>
+            </a:r>
+            <a:endParaRPr dirty="0"/>
           </a:p>
         </p:txBody>
       </p:sp>
@@ -6268,19 +6270,97 @@
           <a:p>
             <a:pPr lvl="1"/>
             <a:r>
-              <a:t>- God</a:t>
+              <a:t>- C</a:t>
             </a:r>
           </a:p>
           <a:p>
             <a:pPr lvl="1"/>
             <a:r>
-              <a:t>- John</a:t>
+              <a:t>- j</a:t>
             </a:r>
           </a:p>
           <a:p>
             <a:pPr lvl="1"/>
             <a:r>
-              <a:t>- Jesus</a:t>
+              <a:t>- f</a:t>
+            </a:r>
+          </a:p>
+          <a:p>
+            <a:pPr lvl="1"/>
+            <a:r>
+              <a:t>- s</a:t>
+            </a:r>
+          </a:p>
+          <a:p>
+            <a:pPr lvl="1"/>
+            <a:r>
+              <a:t>- h</a:t>
+            </a:r>
+          </a:p>
+          <a:p>
+            <a:pPr lvl="1"/>
+            <a:r>
+              <a:t>- b</a:t>
+            </a:r>
+          </a:p>
+          <a:p>
+            <a:pPr lvl="1"/>
+            <a:r>
+              <a:t>- v</a:t>
+            </a:r>
+          </a:p>
+          <a:p>
+            <a:pPr lvl="1"/>
+            <a:r>
+              <a:t>- f</a:t>
+            </a:r>
+          </a:p>
+          <a:p>
+            <a:pPr lvl="1"/>
+            <a:r>
+              <a:t>- h</a:t>
+            </a:r>
+          </a:p>
+          <a:p>
+            <a:pPr lvl="1"/>
+            <a:r>
+              <a:t>- j</a:t>
+            </a:r>
+          </a:p>
+          <a:p>
+            <a:pPr lvl="1"/>
+            <a:r>
+              <a:t>- s</a:t>
+            </a:r>
+          </a:p>
+          <a:p>
+            <a:pPr lvl="1"/>
+            <a:r>
+              <a:t>- b</a:t>
+            </a:r>
+          </a:p>
+          <a:p>
+            <a:pPr lvl="1"/>
+            <a:r>
+              <a:t>- f</a:t>
+            </a:r>
+          </a:p>
+          <a:p>
+            <a:pPr lvl="1"/>
+            <a:r>
+              <a:t>- h</a:t>
+            </a:r>
+          </a:p>
+          <a:p>
+            <a:pPr lvl="1"/>
+            <a:r>
+              <a:t>- s</a:t>
+            </a:r>
+          </a:p>
+          <a:p>
+            <a:pPr lvl="1"/>
+            <a:r>
+              <a:t>- b</a:t>
             </a:r>
           </a:p>
         </p:txBody>

</xml_diff>